<commit_message>
건강 160 service flow >질문 사항 추가
</commit_message>
<xml_diff>
--- a/01 기획/03. 상담 서비스 Flow_健康160_상담 서비스 Flow_2019029.pptx
+++ b/01 기획/03. 상담 서비스 Flow_健康160_상담 서비스 Flow_2019029.pptx
@@ -6169,7 +6169,7 @@
           <a:graphicData uri="http://schemas.openxmlformats.org/presentationml/2006/ole">
             <mc:AlternateContent xmlns:mc="http://schemas.openxmlformats.org/markup-compatibility/2006">
               <mc:Choice xmlns:v="urn:schemas-microsoft-com:vml" Requires="v">
-                <p:oleObj spid="_x0000_s9273" name="think-cell Slide" r:id="rId4" imgW="180" imgH="180" progId="TCLayout.ActiveDocument.1">
+                <p:oleObj spid="_x0000_s9274" name="think-cell Slide" r:id="rId4" imgW="180" imgH="180" progId="TCLayout.ActiveDocument.1">
                   <p:embed/>
                 </p:oleObj>
               </mc:Choice>
@@ -8820,7 +8820,7 @@
                 <a:hlinkClick r:id="rId8" action="ppaction://hlinksldjump">
                   <a:extLst>
                     <a:ext uri="{A12FA001-AC4F-418D-AE19-62706E023703}">
-                      <ahyp:hlinkClr xmlns:ahyp="http://schemas.microsoft.com/office/drawing/2018/hyperlinkcolor" xmlns="" val="tx"/>
+                      <ahyp:hlinkClr xmlns="" xmlns:ahyp="http://schemas.microsoft.com/office/drawing/2018/hyperlinkcolor" val="tx"/>
                     </a:ext>
                   </a:extLst>
                 </a:hlinkClick>
@@ -8833,7 +8833,7 @@
               <a:hlinkClick r:id="rId8" action="ppaction://hlinksldjump">
                 <a:extLst>
                   <a:ext uri="{A12FA001-AC4F-418D-AE19-62706E023703}">
-                    <ahyp:hlinkClr xmlns:ahyp="http://schemas.microsoft.com/office/drawing/2018/hyperlinkcolor" xmlns="" val="tx"/>
+                    <ahyp:hlinkClr xmlns="" xmlns:ahyp="http://schemas.microsoft.com/office/drawing/2018/hyperlinkcolor" val="tx"/>
                   </a:ext>
                 </a:extLst>
               </a:hlinkClick>
@@ -10268,7 +10268,7 @@
                 <a:hlinkClick r:id="rId9" action="ppaction://hlinksldjump">
                   <a:extLst>
                     <a:ext uri="{A12FA001-AC4F-418D-AE19-62706E023703}">
-                      <ahyp:hlinkClr xmlns:ahyp="http://schemas.microsoft.com/office/drawing/2018/hyperlinkcolor" xmlns="" val="tx"/>
+                      <ahyp:hlinkClr xmlns="" xmlns:ahyp="http://schemas.microsoft.com/office/drawing/2018/hyperlinkcolor" val="tx"/>
                     </a:ext>
                   </a:extLst>
                 </a:hlinkClick>
@@ -10281,7 +10281,7 @@
               <a:hlinkClick r:id="rId9" action="ppaction://hlinksldjump">
                 <a:extLst>
                   <a:ext uri="{A12FA001-AC4F-418D-AE19-62706E023703}">
-                    <ahyp:hlinkClr xmlns:ahyp="http://schemas.microsoft.com/office/drawing/2018/hyperlinkcolor" xmlns="" val="tx"/>
+                    <ahyp:hlinkClr xmlns="" xmlns:ahyp="http://schemas.microsoft.com/office/drawing/2018/hyperlinkcolor" val="tx"/>
                   </a:ext>
                 </a:extLst>
               </a:hlinkClick>
@@ -10412,42 +10412,21 @@
                 <a:latin typeface="Arial" panose="020B0604020202020204" pitchFamily="34" charset="0"/>
                 <a:cs typeface="Arial" panose="020B0604020202020204" pitchFamily="34" charset="0"/>
               </a:rPr>
-              <a:t>필요한 정보 입력이 결제 완료 </a:t>
+              <a:t>필요한 정보 입력이 결제 완료 후에 진행되는 것이 맞는지 </a:t>
+            </a:r>
+            <a:r>
+              <a:rPr lang="en-US" altLang="ko-KR" sz="900" b="0" dirty="0" smtClean="0">
+                <a:latin typeface="Arial" panose="020B0604020202020204" pitchFamily="34" charset="0"/>
+                <a:cs typeface="Arial" panose="020B0604020202020204" pitchFamily="34" charset="0"/>
+              </a:rPr>
+              <a:t>flow </a:t>
             </a:r>
             <a:r>
               <a:rPr lang="ko-KR" altLang="en-US" sz="900" b="0" dirty="0" smtClean="0">
                 <a:latin typeface="Arial" panose="020B0604020202020204" pitchFamily="34" charset="0"/>
                 <a:cs typeface="Arial" panose="020B0604020202020204" pitchFamily="34" charset="0"/>
               </a:rPr>
-              <a:t>후에 진행되는 </a:t>
-            </a:r>
-            <a:r>
-              <a:rPr lang="ko-KR" altLang="en-US" sz="900" b="0" dirty="0" smtClean="0">
-                <a:latin typeface="Arial" panose="020B0604020202020204" pitchFamily="34" charset="0"/>
-                <a:cs typeface="Arial" panose="020B0604020202020204" pitchFamily="34" charset="0"/>
-              </a:rPr>
-              <a:t>것이 맞는지 </a:t>
-            </a:r>
-            <a:r>
-              <a:rPr lang="en-US" altLang="ko-KR" sz="900" b="0" dirty="0" smtClean="0">
-                <a:latin typeface="Arial" panose="020B0604020202020204" pitchFamily="34" charset="0"/>
-                <a:cs typeface="Arial" panose="020B0604020202020204" pitchFamily="34" charset="0"/>
-              </a:rPr>
-              <a:t>flow </a:t>
-            </a:r>
-            <a:r>
-              <a:rPr lang="ko-KR" altLang="en-US" sz="900" b="0" dirty="0" smtClean="0">
-                <a:latin typeface="Arial" panose="020B0604020202020204" pitchFamily="34" charset="0"/>
-                <a:cs typeface="Arial" panose="020B0604020202020204" pitchFamily="34" charset="0"/>
-              </a:rPr>
-              <a:t>확인 </a:t>
-            </a:r>
-            <a:r>
-              <a:rPr lang="ko-KR" altLang="en-US" sz="900" b="0" dirty="0" smtClean="0">
-                <a:latin typeface="Arial" panose="020B0604020202020204" pitchFamily="34" charset="0"/>
-                <a:cs typeface="Arial" panose="020B0604020202020204" pitchFamily="34" charset="0"/>
-              </a:rPr>
-              <a:t>요청 </a:t>
+              <a:t>확인 요청 </a:t>
             </a:r>
             <a:r>
               <a:rPr lang="en-US" altLang="ko-KR" sz="900" b="0" dirty="0" smtClean="0">
@@ -10507,82 +10486,71 @@
                 <a:latin typeface="Arial" panose="020B0604020202020204" pitchFamily="34" charset="0"/>
                 <a:cs typeface="Arial" panose="020B0604020202020204" pitchFamily="34" charset="0"/>
               </a:rPr>
-              <a:t>결제 </a:t>
+              <a:t>결제 완료 시 의료진 앱에 구매 정보 </a:t>
+            </a:r>
+            <a:r>
+              <a:rPr lang="ko-KR" altLang="en-US" sz="900" b="0" dirty="0" err="1" smtClean="0">
+                <a:latin typeface="Arial" panose="020B0604020202020204" pitchFamily="34" charset="0"/>
+                <a:cs typeface="Arial" panose="020B0604020202020204" pitchFamily="34" charset="0"/>
+              </a:rPr>
+              <a:t>푸시가</a:t>
             </a:r>
             <a:r>
               <a:rPr lang="ko-KR" altLang="en-US" sz="900" b="0" dirty="0" smtClean="0">
                 <a:latin typeface="Arial" panose="020B0604020202020204" pitchFamily="34" charset="0"/>
                 <a:cs typeface="Arial" panose="020B0604020202020204" pitchFamily="34" charset="0"/>
               </a:rPr>
-              <a:t>완료 시 의료진 앱에 구매 정보 </a:t>
-            </a:r>
-            <a:r>
-              <a:rPr lang="ko-KR" altLang="en-US" sz="900" b="0" dirty="0" err="1" smtClean="0">
+              <a:t> 발송된다고 </a:t>
+            </a:r>
+            <a:r>
+              <a:rPr lang="en-US" altLang="ko-KR" sz="900" b="0" dirty="0" smtClean="0">
                 <a:latin typeface="Arial" panose="020B0604020202020204" pitchFamily="34" charset="0"/>
                 <a:cs typeface="Arial" panose="020B0604020202020204" pitchFamily="34" charset="0"/>
               </a:rPr>
-              <a:t>푸시가</a:t>
+              <a:t>flow</a:t>
             </a:r>
             <a:r>
               <a:rPr lang="ko-KR" altLang="en-US" sz="900" b="0" dirty="0" smtClean="0">
                 <a:latin typeface="Arial" panose="020B0604020202020204" pitchFamily="34" charset="0"/>
                 <a:cs typeface="Arial" panose="020B0604020202020204" pitchFamily="34" charset="0"/>
               </a:rPr>
-              <a:t> 발송된다고 </a:t>
+              <a:t>에 명시되어 있는데</a:t>
             </a:r>
             <a:r>
               <a:rPr lang="en-US" altLang="ko-KR" sz="900" b="0" dirty="0" smtClean="0">
                 <a:latin typeface="Arial" panose="020B0604020202020204" pitchFamily="34" charset="0"/>
                 <a:cs typeface="Arial" panose="020B0604020202020204" pitchFamily="34" charset="0"/>
               </a:rPr>
-              <a:t>flow</a:t>
+              <a:t>, </a:t>
             </a:r>
             <a:r>
               <a:rPr lang="ko-KR" altLang="en-US" sz="900" b="0" dirty="0" smtClean="0">
                 <a:latin typeface="Arial" panose="020B0604020202020204" pitchFamily="34" charset="0"/>
                 <a:cs typeface="Arial" panose="020B0604020202020204" pitchFamily="34" charset="0"/>
               </a:rPr>
-              <a:t>에 명시되어 있는데</a:t>
+              <a:t>푸시 발송 시점이 </a:t>
             </a:r>
             <a:r>
               <a:rPr lang="en-US" altLang="ko-KR" sz="900" b="0" dirty="0" smtClean="0">
                 <a:latin typeface="Arial" panose="020B0604020202020204" pitchFamily="34" charset="0"/>
                 <a:cs typeface="Arial" panose="020B0604020202020204" pitchFamily="34" charset="0"/>
               </a:rPr>
-              <a:t>, </a:t>
+              <a:t>7</a:t>
             </a:r>
             <a:r>
               <a:rPr lang="ko-KR" altLang="en-US" sz="900" b="0" dirty="0" smtClean="0">
                 <a:latin typeface="Arial" panose="020B0604020202020204" pitchFamily="34" charset="0"/>
                 <a:cs typeface="Arial" panose="020B0604020202020204" pitchFamily="34" charset="0"/>
               </a:rPr>
-              <a:t>푸시 발송 시점이 </a:t>
+              <a:t>번 지불 처리 완료 시점인지</a:t>
             </a:r>
             <a:r>
               <a:rPr lang="en-US" altLang="ko-KR" sz="900" b="0" dirty="0" smtClean="0">
                 <a:latin typeface="Arial" panose="020B0604020202020204" pitchFamily="34" charset="0"/>
                 <a:cs typeface="Arial" panose="020B0604020202020204" pitchFamily="34" charset="0"/>
               </a:rPr>
-              <a:t>7</a:t>
-            </a:r>
-            <a:r>
-              <a:rPr lang="ko-KR" altLang="en-US" sz="900" b="0" dirty="0" smtClean="0">
-                <a:latin typeface="Arial" panose="020B0604020202020204" pitchFamily="34" charset="0"/>
-                <a:cs typeface="Arial" panose="020B0604020202020204" pitchFamily="34" charset="0"/>
-              </a:rPr>
-              <a:t>번 지불 처리 완료 시점인지</a:t>
-            </a:r>
-            <a:r>
-              <a:rPr lang="en-US" altLang="ko-KR" sz="900" b="0" dirty="0" smtClean="0">
-                <a:latin typeface="Arial" panose="020B0604020202020204" pitchFamily="34" charset="0"/>
-                <a:cs typeface="Arial" panose="020B0604020202020204" pitchFamily="34" charset="0"/>
-              </a:rPr>
               <a:t>, </a:t>
             </a:r>
-            <a:endParaRPr lang="en-US" altLang="ko-KR" sz="900" b="0" dirty="0" smtClean="0">
-              <a:latin typeface="Arial" panose="020B0604020202020204" pitchFamily="34" charset="0"/>
-              <a:cs typeface="Arial" panose="020B0604020202020204" pitchFamily="34" charset="0"/>
-            </a:endParaRPr>
           </a:p>
           <a:p>
             <a:pPr marR="0" defTabSz="914400" rtl="0" eaLnBrk="1" fontAlgn="base" latinLnBrk="0" hangingPunct="1">
@@ -10611,14 +10579,7 @@
                 <a:latin typeface="Arial" panose="020B0604020202020204" pitchFamily="34" charset="0"/>
                 <a:cs typeface="Arial" panose="020B0604020202020204" pitchFamily="34" charset="0"/>
               </a:rPr>
-              <a:t>   </a:t>
-            </a:r>
-            <a:r>
-              <a:rPr lang="en-US" altLang="ko-KR" sz="900" b="0" dirty="0" smtClean="0">
-                <a:latin typeface="Arial" panose="020B0604020202020204" pitchFamily="34" charset="0"/>
-                <a:cs typeface="Arial" panose="020B0604020202020204" pitchFamily="34" charset="0"/>
-              </a:rPr>
-              <a:t>9</a:t>
+              <a:t>   9</a:t>
             </a:r>
             <a:r>
               <a:rPr lang="ko-KR" altLang="en-US" sz="900" b="0" dirty="0" smtClean="0">
@@ -12845,7 +12806,7 @@
                 <a:hlinkClick r:id="rId9" action="ppaction://hlinksldjump">
                   <a:extLst>
                     <a:ext uri="{A12FA001-AC4F-418D-AE19-62706E023703}">
-                      <ahyp:hlinkClr xmlns:ahyp="http://schemas.microsoft.com/office/drawing/2018/hyperlinkcolor" xmlns="" val="tx"/>
+                      <ahyp:hlinkClr xmlns="" xmlns:ahyp="http://schemas.microsoft.com/office/drawing/2018/hyperlinkcolor" val="tx"/>
                     </a:ext>
                   </a:extLst>
                 </a:hlinkClick>
@@ -12858,7 +12819,7 @@
               <a:hlinkClick r:id="rId9" action="ppaction://hlinksldjump">
                 <a:extLst>
                   <a:ext uri="{A12FA001-AC4F-418D-AE19-62706E023703}">
-                    <ahyp:hlinkClr xmlns:ahyp="http://schemas.microsoft.com/office/drawing/2018/hyperlinkcolor" xmlns="" val="tx"/>
+                    <ahyp:hlinkClr xmlns="" xmlns:ahyp="http://schemas.microsoft.com/office/drawing/2018/hyperlinkcolor" val="tx"/>
                   </a:ext>
                 </a:extLst>
               </a:hlinkClick>
@@ -12960,21 +12921,28 @@
                 <a:latin typeface="Arial" panose="020B0604020202020204" pitchFamily="34" charset="0"/>
                 <a:cs typeface="Arial" panose="020B0604020202020204" pitchFamily="34" charset="0"/>
               </a:rPr>
-              <a:t>상담을 거절하면 어떻게 </a:t>
+              <a:t>거절하기</a:t>
+            </a:r>
+            <a:r>
+              <a:rPr lang="en-US" altLang="ko-KR" sz="900" b="0" dirty="0" smtClean="0">
+                <a:latin typeface="Arial" panose="020B0604020202020204" pitchFamily="34" charset="0"/>
+                <a:cs typeface="Arial" panose="020B0604020202020204" pitchFamily="34" charset="0"/>
+              </a:rPr>
+              <a:t>: </a:t>
             </a:r>
             <a:r>
               <a:rPr lang="ko-KR" altLang="en-US" sz="900" b="0" dirty="0" smtClean="0">
                 <a:latin typeface="Arial" panose="020B0604020202020204" pitchFamily="34" charset="0"/>
                 <a:cs typeface="Arial" panose="020B0604020202020204" pitchFamily="34" charset="0"/>
               </a:rPr>
-              <a:t>되는 것 </a:t>
+              <a:t>상담을 </a:t>
             </a:r>
             <a:r>
               <a:rPr lang="ko-KR" altLang="en-US" sz="900" b="0" dirty="0" smtClean="0">
                 <a:latin typeface="Arial" panose="020B0604020202020204" pitchFamily="34" charset="0"/>
                 <a:cs typeface="Arial" panose="020B0604020202020204" pitchFamily="34" charset="0"/>
               </a:rPr>
-              <a:t>인지</a:t>
+              <a:t>거절하면 어떻게 되는 것 인지</a:t>
             </a:r>
             <a:r>
               <a:rPr lang="en-US" altLang="ko-KR" sz="900" b="0" dirty="0" smtClean="0">
@@ -13015,6 +12983,34 @@
               <a:buChar char="-"/>
               <a:tabLst/>
             </a:pPr>
+            <a:r>
+              <a:rPr lang="ko-KR" altLang="en-US" sz="900" b="0" dirty="0" smtClean="0">
+                <a:latin typeface="Arial" panose="020B0604020202020204" pitchFamily="34" charset="0"/>
+                <a:cs typeface="Arial" panose="020B0604020202020204" pitchFamily="34" charset="0"/>
+              </a:rPr>
+              <a:t>메시지 보내기 </a:t>
+            </a:r>
+            <a:r>
+              <a:rPr lang="en-US" altLang="ko-KR" sz="900" b="0" dirty="0" smtClean="0">
+                <a:latin typeface="Arial" panose="020B0604020202020204" pitchFamily="34" charset="0"/>
+                <a:cs typeface="Arial" panose="020B0604020202020204" pitchFamily="34" charset="0"/>
+              </a:rPr>
+              <a:t>: </a:t>
+            </a:r>
+            <a:r>
+              <a:rPr lang="ko-KR" altLang="en-US" sz="900" b="0" dirty="0" smtClean="0">
+                <a:latin typeface="Arial" panose="020B0604020202020204" pitchFamily="34" charset="0"/>
+                <a:cs typeface="Arial" panose="020B0604020202020204" pitchFamily="34" charset="0"/>
+              </a:rPr>
+              <a:t>해당 기능의 용도는</a:t>
+            </a:r>
+            <a:r>
+              <a:rPr lang="en-US" altLang="ko-KR" sz="900" b="0" dirty="0" smtClean="0">
+                <a:latin typeface="Arial" panose="020B0604020202020204" pitchFamily="34" charset="0"/>
+                <a:cs typeface="Arial" panose="020B0604020202020204" pitchFamily="34" charset="0"/>
+              </a:rPr>
+              <a:t>??</a:t>
+            </a:r>
             <a:endParaRPr lang="en-US" altLang="ko-KR" sz="900" b="0" dirty="0" smtClean="0">
               <a:latin typeface="Arial" panose="020B0604020202020204" pitchFamily="34" charset="0"/>
               <a:cs typeface="Arial" panose="020B0604020202020204" pitchFamily="34" charset="0"/>
@@ -13148,7 +13144,7 @@
                 <a:hlinkClick r:id="rId2" action="ppaction://hlinksldjump">
                   <a:extLst>
                     <a:ext uri="{A12FA001-AC4F-418D-AE19-62706E023703}">
-                      <ahyp:hlinkClr xmlns:ahyp="http://schemas.microsoft.com/office/drawing/2018/hyperlinkcolor" xmlns="" val="tx"/>
+                      <ahyp:hlinkClr xmlns="" xmlns:ahyp="http://schemas.microsoft.com/office/drawing/2018/hyperlinkcolor" val="tx"/>
                     </a:ext>
                   </a:extLst>
                 </a:hlinkClick>
@@ -13161,7 +13157,7 @@
               <a:hlinkClick r:id="rId2" action="ppaction://hlinksldjump">
                 <a:extLst>
                   <a:ext uri="{A12FA001-AC4F-418D-AE19-62706E023703}">
-                    <ahyp:hlinkClr xmlns:ahyp="http://schemas.microsoft.com/office/drawing/2018/hyperlinkcolor" xmlns="" val="tx"/>
+                    <ahyp:hlinkClr xmlns="" xmlns:ahyp="http://schemas.microsoft.com/office/drawing/2018/hyperlinkcolor" val="tx"/>
                   </a:ext>
                 </a:extLst>
               </a:hlinkClick>
@@ -14888,7 +14884,7 @@
           <a:graphicData uri="http://schemas.openxmlformats.org/presentationml/2006/ole">
             <mc:AlternateContent xmlns:mc="http://schemas.openxmlformats.org/markup-compatibility/2006">
               <mc:Choice xmlns:v="urn:schemas-microsoft-com:vml" Requires="v">
-                <p:oleObj spid="_x0000_s18450" name="think-cell Slide" r:id="rId4" imgW="180" imgH="180" progId="TCLayout.ActiveDocument.1">
+                <p:oleObj spid="_x0000_s18451" name="think-cell Slide" r:id="rId4" imgW="180" imgH="180" progId="TCLayout.ActiveDocument.1">
                   <p:embed/>
                 </p:oleObj>
               </mc:Choice>
@@ -15068,7 +15064,7 @@
           <a:graphicData uri="http://schemas.openxmlformats.org/presentationml/2006/ole">
             <mc:AlternateContent xmlns:mc="http://schemas.openxmlformats.org/markup-compatibility/2006">
               <mc:Choice xmlns:v="urn:schemas-microsoft-com:vml" Requires="v">
-                <p:oleObj spid="_x0000_s15386" name="think-cell Slide" r:id="rId4" imgW="180" imgH="180" progId="TCLayout.ActiveDocument.1">
+                <p:oleObj spid="_x0000_s15387" name="think-cell Slide" r:id="rId4" imgW="180" imgH="180" progId="TCLayout.ActiveDocument.1">
                   <p:embed/>
                 </p:oleObj>
               </mc:Choice>
@@ -18764,6 +18760,506 @@
           </a:p>
         </p:txBody>
       </p:sp>
+      <p:sp>
+        <p:nvSpPr>
+          <p:cNvPr id="56" name="모서리가 둥근 직사각형 55"/>
+          <p:cNvSpPr/>
+          <p:nvPr/>
+        </p:nvSpPr>
+        <p:spPr bwMode="auto">
+          <a:xfrm>
+            <a:off x="109564" y="4953109"/>
+            <a:ext cx="7771440" cy="1037364"/>
+          </a:xfrm>
+          <a:prstGeom prst="roundRect">
+            <a:avLst/>
+          </a:prstGeom>
+          <a:solidFill>
+            <a:srgbClr val="FFFF00"/>
+          </a:solidFill>
+          <a:ln w="9525" cap="flat" cmpd="sng" algn="ctr">
+            <a:solidFill>
+              <a:schemeClr val="tx1">
+                <a:lumMod val="50000"/>
+                <a:lumOff val="50000"/>
+              </a:schemeClr>
+            </a:solidFill>
+            <a:prstDash val="solid"/>
+            <a:round/>
+            <a:headEnd type="none" w="med" len="med"/>
+            <a:tailEnd type="none" w="med" len="med"/>
+          </a:ln>
+          <a:effectLst/>
+        </p:spPr>
+        <p:txBody>
+          <a:bodyPr vert="horz" wrap="none" lIns="91440" tIns="45720" rIns="91440" bIns="45720" numCol="1" rtlCol="0" anchor="t" anchorCtr="0" compatLnSpc="1">
+            <a:prstTxWarp prst="textNoShape">
+              <a:avLst/>
+            </a:prstTxWarp>
+          </a:bodyPr>
+          <a:lstStyle/>
+          <a:p>
+            <a:pPr marL="228600" marR="0" indent="-228600" defTabSz="914400" rtl="0" eaLnBrk="1" fontAlgn="base" latinLnBrk="0" hangingPunct="1">
+              <a:lnSpc>
+                <a:spcPct val="100000"/>
+              </a:lnSpc>
+              <a:spcBef>
+                <a:spcPct val="20000"/>
+              </a:spcBef>
+              <a:spcAft>
+                <a:spcPct val="20000"/>
+              </a:spcAft>
+              <a:buClrTx/>
+              <a:buSzTx/>
+              <a:buFont typeface="Wingdings" pitchFamily="2" charset="2"/>
+              <a:buAutoNum type="arabicPeriod"/>
+              <a:tabLst/>
+            </a:pPr>
+            <a:r>
+              <a:rPr kumimoji="1" lang="en-US" altLang="ko-KR" sz="900" b="0" i="0" u="none" strike="noStrike" cap="none" normalizeH="0" baseline="0" dirty="0" smtClean="0">
+                <a:ln>
+                  <a:noFill/>
+                </a:ln>
+                <a:effectLst/>
+                <a:latin typeface="Arial" panose="020B0604020202020204" pitchFamily="34" charset="0"/>
+                <a:cs typeface="Arial" panose="020B0604020202020204" pitchFamily="34" charset="0"/>
+              </a:rPr>
+              <a:t>4,6,7</a:t>
+            </a:r>
+            <a:r>
+              <a:rPr kumimoji="1" lang="ko-KR" altLang="en-US" sz="900" b="0" i="0" u="none" strike="noStrike" cap="none" normalizeH="0" baseline="0" dirty="0" smtClean="0">
+                <a:ln>
+                  <a:noFill/>
+                </a:ln>
+                <a:effectLst/>
+                <a:latin typeface="Arial" panose="020B0604020202020204" pitchFamily="34" charset="0"/>
+                <a:cs typeface="Arial" panose="020B0604020202020204" pitchFamily="34" charset="0"/>
+              </a:rPr>
+              <a:t>번 </a:t>
+            </a:r>
+            <a:r>
+              <a:rPr lang="en-US" altLang="ko-KR" sz="900" b="0" dirty="0" smtClean="0">
+                <a:latin typeface="Arial" panose="020B0604020202020204" pitchFamily="34" charset="0"/>
+                <a:cs typeface="Arial" panose="020B0604020202020204" pitchFamily="34" charset="0"/>
+              </a:rPr>
+              <a:t>flow</a:t>
+            </a:r>
+            <a:r>
+              <a:rPr lang="ko-KR" altLang="en-US" sz="900" b="0" dirty="0" smtClean="0">
+                <a:latin typeface="Arial" panose="020B0604020202020204" pitchFamily="34" charset="0"/>
+                <a:cs typeface="Arial" panose="020B0604020202020204" pitchFamily="34" charset="0"/>
+              </a:rPr>
+              <a:t>와 화면 캡쳐 </a:t>
+            </a:r>
+            <a:r>
+              <a:rPr lang="en-US" altLang="ko-KR" sz="900" b="0" dirty="0" smtClean="0">
+                <a:latin typeface="Arial" panose="020B0604020202020204" pitchFamily="34" charset="0"/>
+                <a:cs typeface="Arial" panose="020B0604020202020204" pitchFamily="34" charset="0"/>
+              </a:rPr>
+              <a:t>flow </a:t>
+            </a:r>
+            <a:r>
+              <a:rPr lang="ko-KR" altLang="en-US" sz="900" b="0" dirty="0" smtClean="0">
+                <a:latin typeface="Arial" panose="020B0604020202020204" pitchFamily="34" charset="0"/>
+                <a:cs typeface="Arial" panose="020B0604020202020204" pitchFamily="34" charset="0"/>
+              </a:rPr>
+              <a:t>가 일치하지 않음</a:t>
+            </a:r>
+            <a:r>
+              <a:rPr lang="en-US" altLang="ko-KR" sz="900" b="0" dirty="0" smtClean="0">
+                <a:latin typeface="Arial" panose="020B0604020202020204" pitchFamily="34" charset="0"/>
+                <a:cs typeface="Arial" panose="020B0604020202020204" pitchFamily="34" charset="0"/>
+              </a:rPr>
+              <a:t>.</a:t>
+            </a:r>
+          </a:p>
+          <a:p>
+            <a:pPr marR="0" defTabSz="914400" rtl="0" eaLnBrk="1" fontAlgn="base" latinLnBrk="0" hangingPunct="1">
+              <a:lnSpc>
+                <a:spcPct val="100000"/>
+              </a:lnSpc>
+              <a:spcBef>
+                <a:spcPct val="20000"/>
+              </a:spcBef>
+              <a:spcAft>
+                <a:spcPct val="20000"/>
+              </a:spcAft>
+              <a:buClrTx/>
+              <a:buSzTx/>
+              <a:tabLst/>
+            </a:pPr>
+            <a:r>
+              <a:rPr lang="en-US" altLang="ko-KR" sz="900" b="0" dirty="0" smtClean="0">
+                <a:latin typeface="Arial" panose="020B0604020202020204" pitchFamily="34" charset="0"/>
+                <a:cs typeface="Arial" panose="020B0604020202020204" pitchFamily="34" charset="0"/>
+              </a:rPr>
+              <a:t>2. </a:t>
+            </a:r>
+            <a:r>
+              <a:rPr lang="ko-KR" altLang="en-US" sz="900" b="0" dirty="0" smtClean="0">
+                <a:latin typeface="Arial" panose="020B0604020202020204" pitchFamily="34" charset="0"/>
+                <a:cs typeface="Arial" panose="020B0604020202020204" pitchFamily="34" charset="0"/>
+              </a:rPr>
+              <a:t>구매 정보 푸시 발송 시점 확인 요청 </a:t>
+            </a:r>
+            <a:r>
+              <a:rPr lang="en-US" altLang="ko-KR" sz="900" b="0" dirty="0" smtClean="0">
+                <a:latin typeface="Arial" panose="020B0604020202020204" pitchFamily="34" charset="0"/>
+                <a:cs typeface="Arial" panose="020B0604020202020204" pitchFamily="34" charset="0"/>
+              </a:rPr>
+              <a:t>: </a:t>
+            </a:r>
+            <a:r>
+              <a:rPr lang="ko-KR" altLang="en-US" sz="900" b="0" dirty="0" smtClean="0">
+                <a:latin typeface="Arial" panose="020B0604020202020204" pitchFamily="34" charset="0"/>
+                <a:cs typeface="Arial" panose="020B0604020202020204" pitchFamily="34" charset="0"/>
+              </a:rPr>
+              <a:t>화면 캡쳐에서는 결제 완료 후 </a:t>
+            </a:r>
+            <a:r>
+              <a:rPr lang="en-US" altLang="ko-KR" sz="900" b="0" dirty="0" smtClean="0">
+                <a:latin typeface="Arial" panose="020B0604020202020204" pitchFamily="34" charset="0"/>
+                <a:cs typeface="Arial" panose="020B0604020202020204" pitchFamily="34" charset="0"/>
+              </a:rPr>
+              <a:t>‘</a:t>
+            </a:r>
+            <a:r>
+              <a:rPr lang="ko-KR" altLang="en-US" sz="900" b="0" dirty="0" smtClean="0">
+                <a:latin typeface="Arial" panose="020B0604020202020204" pitchFamily="34" charset="0"/>
+                <a:cs typeface="Arial" panose="020B0604020202020204" pitchFamily="34" charset="0"/>
+              </a:rPr>
+              <a:t>필수 정보 입력</a:t>
+            </a:r>
+            <a:r>
+              <a:rPr lang="en-US" altLang="ko-KR" sz="900" b="0" dirty="0" smtClean="0">
+                <a:latin typeface="Arial" panose="020B0604020202020204" pitchFamily="34" charset="0"/>
+                <a:cs typeface="Arial" panose="020B0604020202020204" pitchFamily="34" charset="0"/>
+              </a:rPr>
+              <a:t>’</a:t>
+            </a:r>
+            <a:r>
+              <a:rPr lang="ko-KR" altLang="en-US" sz="900" b="0" dirty="0" smtClean="0">
+                <a:latin typeface="Arial" panose="020B0604020202020204" pitchFamily="34" charset="0"/>
+                <a:cs typeface="Arial" panose="020B0604020202020204" pitchFamily="34" charset="0"/>
+              </a:rPr>
+              <a:t> 및 </a:t>
+            </a:r>
+            <a:r>
+              <a:rPr lang="en-US" altLang="ko-KR" sz="900" b="0" dirty="0" smtClean="0">
+                <a:latin typeface="Arial" panose="020B0604020202020204" pitchFamily="34" charset="0"/>
+                <a:cs typeface="Arial" panose="020B0604020202020204" pitchFamily="34" charset="0"/>
+              </a:rPr>
+              <a:t>‘</a:t>
+            </a:r>
+            <a:r>
+              <a:rPr lang="ko-KR" altLang="en-US" sz="900" b="0" dirty="0" smtClean="0">
+                <a:latin typeface="Arial" panose="020B0604020202020204" pitchFamily="34" charset="0"/>
+                <a:cs typeface="Arial" panose="020B0604020202020204" pitchFamily="34" charset="0"/>
+              </a:rPr>
+              <a:t>주문 상세 내용 확인</a:t>
+            </a:r>
+            <a:r>
+              <a:rPr lang="en-US" altLang="ko-KR" sz="900" b="0" dirty="0" smtClean="0">
+                <a:latin typeface="Arial" panose="020B0604020202020204" pitchFamily="34" charset="0"/>
+                <a:cs typeface="Arial" panose="020B0604020202020204" pitchFamily="34" charset="0"/>
+              </a:rPr>
+              <a:t>’ flow</a:t>
+            </a:r>
+            <a:r>
+              <a:rPr lang="ko-KR" altLang="en-US" sz="900" b="0" dirty="0" smtClean="0">
+                <a:latin typeface="Arial" panose="020B0604020202020204" pitchFamily="34" charset="0"/>
+                <a:cs typeface="Arial" panose="020B0604020202020204" pitchFamily="34" charset="0"/>
+              </a:rPr>
+              <a:t>가 있는데</a:t>
+            </a:r>
+            <a:r>
+              <a:rPr lang="en-US" altLang="ko-KR" sz="900" b="0" dirty="0" smtClean="0">
+                <a:latin typeface="Arial" panose="020B0604020202020204" pitchFamily="34" charset="0"/>
+                <a:cs typeface="Arial" panose="020B0604020202020204" pitchFamily="34" charset="0"/>
+              </a:rPr>
+              <a:t>,</a:t>
+            </a:r>
+          </a:p>
+          <a:p>
+            <a:pPr marR="0" defTabSz="914400" rtl="0" eaLnBrk="1" fontAlgn="base" latinLnBrk="0" hangingPunct="1">
+              <a:lnSpc>
+                <a:spcPct val="100000"/>
+              </a:lnSpc>
+              <a:spcBef>
+                <a:spcPct val="20000"/>
+              </a:spcBef>
+              <a:spcAft>
+                <a:spcPct val="20000"/>
+              </a:spcAft>
+              <a:buClrTx/>
+              <a:buSzTx/>
+              <a:tabLst/>
+            </a:pPr>
+            <a:r>
+              <a:rPr kumimoji="1" lang="en-US" altLang="ko-KR" sz="900" b="0" i="0" u="none" strike="noStrike" cap="none" normalizeH="0" baseline="0" dirty="0">
+                <a:ln>
+                  <a:noFill/>
+                </a:ln>
+                <a:effectLst/>
+                <a:latin typeface="Arial" panose="020B0604020202020204" pitchFamily="34" charset="0"/>
+                <a:cs typeface="Arial" panose="020B0604020202020204" pitchFamily="34" charset="0"/>
+              </a:rPr>
+              <a:t> </a:t>
+            </a:r>
+            <a:r>
+              <a:rPr kumimoji="1" lang="en-US" altLang="ko-KR" sz="900" b="0" i="0" u="none" strike="noStrike" cap="none" normalizeH="0" baseline="0" dirty="0" smtClean="0">
+                <a:ln>
+                  <a:noFill/>
+                </a:ln>
+                <a:effectLst/>
+                <a:latin typeface="Arial" panose="020B0604020202020204" pitchFamily="34" charset="0"/>
+                <a:cs typeface="Arial" panose="020B0604020202020204" pitchFamily="34" charset="0"/>
+              </a:rPr>
+              <a:t>‘</a:t>
+            </a:r>
+            <a:r>
+              <a:rPr kumimoji="1" lang="ko-KR" altLang="en-US" sz="900" b="0" i="0" u="none" strike="noStrike" cap="none" normalizeH="0" baseline="0" dirty="0" smtClean="0">
+                <a:ln>
+                  <a:noFill/>
+                </a:ln>
+                <a:effectLst/>
+                <a:latin typeface="Arial" panose="020B0604020202020204" pitchFamily="34" charset="0"/>
+                <a:cs typeface="Arial" panose="020B0604020202020204" pitchFamily="34" charset="0"/>
+              </a:rPr>
+              <a:t>주문 상세 내용 확인</a:t>
+            </a:r>
+            <a:r>
+              <a:rPr kumimoji="1" lang="en-US" altLang="ko-KR" sz="900" b="0" i="0" u="none" strike="noStrike" cap="none" normalizeH="0" baseline="0" dirty="0" smtClean="0">
+                <a:ln>
+                  <a:noFill/>
+                </a:ln>
+                <a:effectLst/>
+                <a:latin typeface="Arial" panose="020B0604020202020204" pitchFamily="34" charset="0"/>
+                <a:cs typeface="Arial" panose="020B0604020202020204" pitchFamily="34" charset="0"/>
+              </a:rPr>
+              <a:t>＇</a:t>
+            </a:r>
+            <a:r>
+              <a:rPr kumimoji="1" lang="ko-KR" altLang="en-US" sz="900" b="0" i="0" u="none" strike="noStrike" cap="none" normalizeH="0" baseline="0" dirty="0" smtClean="0">
+                <a:ln>
+                  <a:noFill/>
+                </a:ln>
+                <a:effectLst/>
+                <a:latin typeface="Arial" panose="020B0604020202020204" pitchFamily="34" charset="0"/>
+                <a:cs typeface="Arial" panose="020B0604020202020204" pitchFamily="34" charset="0"/>
+              </a:rPr>
+              <a:t>단계에서</a:t>
+            </a:r>
+            <a:r>
+              <a:rPr kumimoji="1" lang="ko-KR" altLang="en-US" sz="900" b="0" i="0" u="none" strike="noStrike" cap="none" normalizeH="0" dirty="0" smtClean="0">
+                <a:ln>
+                  <a:noFill/>
+                </a:ln>
+                <a:effectLst/>
+                <a:latin typeface="Arial" panose="020B0604020202020204" pitchFamily="34" charset="0"/>
+                <a:cs typeface="Arial" panose="020B0604020202020204" pitchFamily="34" charset="0"/>
+              </a:rPr>
+              <a:t> 의료진 앱으로 구매정보 </a:t>
+            </a:r>
+            <a:r>
+              <a:rPr kumimoji="1" lang="ko-KR" altLang="en-US" sz="900" b="0" i="0" u="none" strike="noStrike" cap="none" normalizeH="0" dirty="0" err="1" smtClean="0">
+                <a:ln>
+                  <a:noFill/>
+                </a:ln>
+                <a:effectLst/>
+                <a:latin typeface="Arial" panose="020B0604020202020204" pitchFamily="34" charset="0"/>
+                <a:cs typeface="Arial" panose="020B0604020202020204" pitchFamily="34" charset="0"/>
+              </a:rPr>
+              <a:t>푸시가</a:t>
+            </a:r>
+            <a:r>
+              <a:rPr kumimoji="1" lang="ko-KR" altLang="en-US" sz="900" b="0" i="0" u="none" strike="noStrike" cap="none" normalizeH="0" dirty="0" smtClean="0">
+                <a:ln>
+                  <a:noFill/>
+                </a:ln>
+                <a:effectLst/>
+                <a:latin typeface="Arial" panose="020B0604020202020204" pitchFamily="34" charset="0"/>
+                <a:cs typeface="Arial" panose="020B0604020202020204" pitchFamily="34" charset="0"/>
+              </a:rPr>
+              <a:t> 발송되는 것인지</a:t>
+            </a:r>
+            <a:r>
+              <a:rPr lang="en-US" altLang="ko-KR" sz="900" b="0" dirty="0">
+                <a:latin typeface="Arial" panose="020B0604020202020204" pitchFamily="34" charset="0"/>
+                <a:cs typeface="Arial" panose="020B0604020202020204" pitchFamily="34" charset="0"/>
+              </a:rPr>
+              <a:t>?</a:t>
+            </a:r>
+            <a:r>
+              <a:rPr lang="ko-KR" altLang="en-US" sz="900" b="0" dirty="0" smtClean="0">
+                <a:latin typeface="Arial" panose="020B0604020202020204" pitchFamily="34" charset="0"/>
+                <a:cs typeface="Arial" panose="020B0604020202020204" pitchFamily="34" charset="0"/>
+              </a:rPr>
+              <a:t> </a:t>
+            </a:r>
+            <a:endParaRPr lang="en-US" altLang="ko-KR" sz="900" b="0" dirty="0" smtClean="0">
+              <a:latin typeface="Arial" panose="020B0604020202020204" pitchFamily="34" charset="0"/>
+              <a:cs typeface="Arial" panose="020B0604020202020204" pitchFamily="34" charset="0"/>
+            </a:endParaRPr>
+          </a:p>
+          <a:p>
+            <a:pPr marR="0" defTabSz="914400" rtl="0" eaLnBrk="1" fontAlgn="base" latinLnBrk="0" hangingPunct="1">
+              <a:lnSpc>
+                <a:spcPct val="100000"/>
+              </a:lnSpc>
+              <a:spcBef>
+                <a:spcPct val="20000"/>
+              </a:spcBef>
+              <a:spcAft>
+                <a:spcPct val="20000"/>
+              </a:spcAft>
+              <a:buClrTx/>
+              <a:buSzTx/>
+              <a:tabLst/>
+            </a:pPr>
+            <a:r>
+              <a:rPr kumimoji="1" lang="en-US" altLang="ko-KR" sz="900" b="0" i="0" u="none" strike="noStrike" cap="none" normalizeH="0" baseline="0" dirty="0" smtClean="0">
+                <a:ln>
+                  <a:noFill/>
+                </a:ln>
+                <a:effectLst/>
+                <a:latin typeface="Arial" panose="020B0604020202020204" pitchFamily="34" charset="0"/>
+                <a:cs typeface="Arial" panose="020B0604020202020204" pitchFamily="34" charset="0"/>
+              </a:rPr>
+              <a:t>3. </a:t>
+            </a:r>
+            <a:r>
+              <a:rPr lang="ko-KR" altLang="en-US" sz="900" b="0" dirty="0" smtClean="0">
+                <a:latin typeface="Arial" panose="020B0604020202020204" pitchFamily="34" charset="0"/>
+                <a:cs typeface="Arial" panose="020B0604020202020204" pitchFamily="34" charset="0"/>
+              </a:rPr>
+              <a:t>환자와의 전화 연결이 </a:t>
+            </a:r>
+            <a:r>
+              <a:rPr lang="en-US" altLang="ko-KR" sz="900" b="0" dirty="0" smtClean="0">
+                <a:latin typeface="Arial" panose="020B0604020202020204" pitchFamily="34" charset="0"/>
+                <a:cs typeface="Arial" panose="020B0604020202020204" pitchFamily="34" charset="0"/>
+              </a:rPr>
+              <a:t>3</a:t>
+            </a:r>
+            <a:r>
+              <a:rPr lang="ko-KR" altLang="en-US" sz="900" b="0" dirty="0" smtClean="0">
+                <a:latin typeface="Arial" panose="020B0604020202020204" pitchFamily="34" charset="0"/>
+                <a:cs typeface="Arial" panose="020B0604020202020204" pitchFamily="34" charset="0"/>
+              </a:rPr>
+              <a:t>번 실패하면 상담이 자동적으로 취소가 되는 것인지</a:t>
+            </a:r>
+            <a:r>
+              <a:rPr lang="en-US" altLang="ko-KR" sz="900" b="0" dirty="0" smtClean="0">
+                <a:latin typeface="Arial" panose="020B0604020202020204" pitchFamily="34" charset="0"/>
+                <a:cs typeface="Arial" panose="020B0604020202020204" pitchFamily="34" charset="0"/>
+              </a:rPr>
+              <a:t>?</a:t>
+            </a:r>
+          </a:p>
+          <a:p>
+            <a:pPr marR="0" defTabSz="914400" rtl="0" eaLnBrk="1" fontAlgn="base" latinLnBrk="0" hangingPunct="1">
+              <a:lnSpc>
+                <a:spcPct val="100000"/>
+              </a:lnSpc>
+              <a:spcBef>
+                <a:spcPct val="20000"/>
+              </a:spcBef>
+              <a:spcAft>
+                <a:spcPct val="20000"/>
+              </a:spcAft>
+              <a:buClrTx/>
+              <a:buSzTx/>
+              <a:tabLst/>
+            </a:pPr>
+            <a:r>
+              <a:rPr kumimoji="1" lang="en-US" altLang="ko-KR" sz="900" b="0" i="0" u="none" strike="noStrike" cap="none" normalizeH="0" baseline="0" dirty="0" smtClean="0">
+                <a:ln>
+                  <a:noFill/>
+                </a:ln>
+                <a:effectLst/>
+                <a:latin typeface="Arial" panose="020B0604020202020204" pitchFamily="34" charset="0"/>
+                <a:cs typeface="Arial" panose="020B0604020202020204" pitchFamily="34" charset="0"/>
+              </a:rPr>
+              <a:t>4. 3</a:t>
+            </a:r>
+            <a:r>
+              <a:rPr kumimoji="1" lang="ko-KR" altLang="en-US" sz="900" b="0" i="0" u="none" strike="noStrike" cap="none" normalizeH="0" baseline="0" dirty="0" smtClean="0">
+                <a:ln>
+                  <a:noFill/>
+                </a:ln>
+                <a:effectLst/>
+                <a:latin typeface="Arial" panose="020B0604020202020204" pitchFamily="34" charset="0"/>
+                <a:cs typeface="Arial" panose="020B0604020202020204" pitchFamily="34" charset="0"/>
+              </a:rPr>
+              <a:t>번 부재 전까지는 환자가 앱에서 의료진에게 즉시 연결이 가능하다고 쓰여 있는데</a:t>
+            </a:r>
+            <a:r>
+              <a:rPr kumimoji="1" lang="en-US" altLang="ko-KR" sz="900" b="0" i="0" u="none" strike="noStrike" cap="none" normalizeH="0" baseline="0" dirty="0" smtClean="0">
+                <a:ln>
+                  <a:noFill/>
+                </a:ln>
+                <a:effectLst/>
+                <a:latin typeface="Arial" panose="020B0604020202020204" pitchFamily="34" charset="0"/>
+                <a:cs typeface="Arial" panose="020B0604020202020204" pitchFamily="34" charset="0"/>
+              </a:rPr>
+              <a:t>, </a:t>
+            </a:r>
+            <a:r>
+              <a:rPr kumimoji="1" lang="ko-KR" altLang="en-US" sz="900" b="0" i="0" u="none" strike="noStrike" cap="none" normalizeH="0" baseline="0" dirty="0" err="1" smtClean="0">
+                <a:ln>
+                  <a:noFill/>
+                </a:ln>
+                <a:effectLst/>
+                <a:latin typeface="Arial" panose="020B0604020202020204" pitchFamily="34" charset="0"/>
+                <a:cs typeface="Arial" panose="020B0604020202020204" pitchFamily="34" charset="0"/>
+              </a:rPr>
+              <a:t>상담예약</a:t>
+            </a:r>
+            <a:r>
+              <a:rPr kumimoji="1" lang="ko-KR" altLang="en-US" sz="900" b="0" i="0" u="none" strike="noStrike" cap="none" normalizeH="0" dirty="0" smtClean="0">
+                <a:ln>
+                  <a:noFill/>
+                </a:ln>
+                <a:effectLst/>
+                <a:latin typeface="Arial" panose="020B0604020202020204" pitchFamily="34" charset="0"/>
+                <a:cs typeface="Arial" panose="020B0604020202020204" pitchFamily="34" charset="0"/>
+              </a:rPr>
+              <a:t> 시간과 무관하게 계속 전화를 시도할 수 </a:t>
+            </a:r>
+            <a:r>
+              <a:rPr kumimoji="1" lang="ko-KR" altLang="en-US" sz="900" b="0" i="0" u="none" strike="noStrike" cap="none" normalizeH="0" dirty="0" err="1" smtClean="0">
+                <a:ln>
+                  <a:noFill/>
+                </a:ln>
+                <a:effectLst/>
+                <a:latin typeface="Arial" panose="020B0604020202020204" pitchFamily="34" charset="0"/>
+                <a:cs typeface="Arial" panose="020B0604020202020204" pitchFamily="34" charset="0"/>
+              </a:rPr>
+              <a:t>있는것인지</a:t>
+            </a:r>
+            <a:r>
+              <a:rPr kumimoji="1" lang="en-US" altLang="ko-KR" sz="900" b="0" i="0" u="none" strike="noStrike" cap="none" normalizeH="0" dirty="0" smtClean="0">
+                <a:ln>
+                  <a:noFill/>
+                </a:ln>
+                <a:effectLst/>
+                <a:latin typeface="Arial" panose="020B0604020202020204" pitchFamily="34" charset="0"/>
+                <a:cs typeface="Arial" panose="020B0604020202020204" pitchFamily="34" charset="0"/>
+              </a:rPr>
+              <a:t>?</a:t>
+            </a:r>
+            <a:endParaRPr kumimoji="1" lang="ko-KR" altLang="en-US" sz="900" b="0" i="0" u="none" strike="noStrike" cap="none" normalizeH="0" baseline="0" dirty="0" smtClean="0">
+              <a:ln>
+                <a:noFill/>
+              </a:ln>
+              <a:effectLst/>
+              <a:latin typeface="Arial" panose="020B0604020202020204" pitchFamily="34" charset="0"/>
+              <a:cs typeface="Arial" panose="020B0604020202020204" pitchFamily="34" charset="0"/>
+            </a:endParaRPr>
+          </a:p>
+        </p:txBody>
+      </p:sp>
     </p:spTree>
     <p:extLst>
       <p:ext uri="{BB962C8B-B14F-4D97-AF65-F5344CB8AC3E}">
@@ -18918,7 +19414,7 @@
                 <a:hlinkClick r:id="rId3" action="ppaction://hlinksldjump">
                   <a:extLst>
                     <a:ext uri="{A12FA001-AC4F-418D-AE19-62706E023703}">
-                      <ahyp:hlinkClr xmlns:ahyp="http://schemas.microsoft.com/office/drawing/2018/hyperlinkcolor" xmlns="" val="tx"/>
+                      <ahyp:hlinkClr xmlns="" xmlns:ahyp="http://schemas.microsoft.com/office/drawing/2018/hyperlinkcolor" val="tx"/>
                     </a:ext>
                   </a:extLst>
                 </a:hlinkClick>
@@ -18931,7 +19427,7 @@
               <a:hlinkClick r:id="rId3" action="ppaction://hlinksldjump">
                 <a:extLst>
                   <a:ext uri="{A12FA001-AC4F-418D-AE19-62706E023703}">
-                    <ahyp:hlinkClr xmlns:ahyp="http://schemas.microsoft.com/office/drawing/2018/hyperlinkcolor" xmlns="" val="tx"/>
+                    <ahyp:hlinkClr xmlns="" xmlns:ahyp="http://schemas.microsoft.com/office/drawing/2018/hyperlinkcolor" val="tx"/>
                   </a:ext>
                 </a:extLst>
               </a:hlinkClick>
@@ -22524,7 +23020,7 @@
                 <a:hlinkClick r:id="rId7" action="ppaction://hlinksldjump">
                   <a:extLst>
                     <a:ext uri="{A12FA001-AC4F-418D-AE19-62706E023703}">
-                      <ahyp:hlinkClr xmlns:ahyp="http://schemas.microsoft.com/office/drawing/2018/hyperlinkcolor" xmlns="" val="tx"/>
+                      <ahyp:hlinkClr xmlns="" xmlns:ahyp="http://schemas.microsoft.com/office/drawing/2018/hyperlinkcolor" val="tx"/>
                     </a:ext>
                   </a:extLst>
                 </a:hlinkClick>
@@ -22537,7 +23033,7 @@
               <a:hlinkClick r:id="rId7" action="ppaction://hlinksldjump">
                 <a:extLst>
                   <a:ext uri="{A12FA001-AC4F-418D-AE19-62706E023703}">
-                    <ahyp:hlinkClr xmlns:ahyp="http://schemas.microsoft.com/office/drawing/2018/hyperlinkcolor" xmlns="" val="tx"/>
+                    <ahyp:hlinkClr xmlns="" xmlns:ahyp="http://schemas.microsoft.com/office/drawing/2018/hyperlinkcolor" val="tx"/>
                   </a:ext>
                 </a:extLst>
               </a:hlinkClick>
@@ -22730,6 +23226,144 @@
               <a:latin typeface="Arial" panose="020B0604020202020204" pitchFamily="34" charset="0"/>
               <a:cs typeface="Arial" panose="020B0604020202020204" pitchFamily="34" charset="0"/>
             </a:endParaRPr>
+          </a:p>
+        </p:txBody>
+      </p:sp>
+      <p:sp>
+        <p:nvSpPr>
+          <p:cNvPr id="26" name="모서리가 둥근 직사각형 25"/>
+          <p:cNvSpPr/>
+          <p:nvPr/>
+        </p:nvSpPr>
+        <p:spPr bwMode="auto">
+          <a:xfrm>
+            <a:off x="5096394" y="5637456"/>
+            <a:ext cx="4429202" cy="1067907"/>
+          </a:xfrm>
+          <a:prstGeom prst="roundRect">
+            <a:avLst/>
+          </a:prstGeom>
+          <a:solidFill>
+            <a:srgbClr val="FFFF00"/>
+          </a:solidFill>
+          <a:ln w="9525" cap="flat" cmpd="sng" algn="ctr">
+            <a:solidFill>
+              <a:schemeClr val="tx1">
+                <a:lumMod val="50000"/>
+                <a:lumOff val="50000"/>
+              </a:schemeClr>
+            </a:solidFill>
+            <a:prstDash val="solid"/>
+            <a:round/>
+            <a:headEnd type="none" w="med" len="med"/>
+            <a:tailEnd type="none" w="med" len="med"/>
+          </a:ln>
+          <a:effectLst/>
+        </p:spPr>
+        <p:txBody>
+          <a:bodyPr vert="horz" wrap="none" lIns="91440" tIns="45720" rIns="91440" bIns="45720" numCol="1" rtlCol="0" anchor="t" anchorCtr="0" compatLnSpc="1">
+            <a:prstTxWarp prst="textNoShape">
+              <a:avLst/>
+            </a:prstTxWarp>
+          </a:bodyPr>
+          <a:lstStyle/>
+          <a:p>
+            <a:pPr marR="0" defTabSz="914400" rtl="0" eaLnBrk="1" fontAlgn="base" latinLnBrk="0" hangingPunct="1">
+              <a:lnSpc>
+                <a:spcPct val="100000"/>
+              </a:lnSpc>
+              <a:spcBef>
+                <a:spcPct val="20000"/>
+              </a:spcBef>
+              <a:spcAft>
+                <a:spcPct val="20000"/>
+              </a:spcAft>
+              <a:buClrTx/>
+              <a:buSzTx/>
+              <a:tabLst/>
+            </a:pPr>
+            <a:r>
+              <a:rPr lang="en-US" altLang="ko-KR" sz="900" b="0" dirty="0" smtClean="0">
+                <a:latin typeface="Arial" panose="020B0604020202020204" pitchFamily="34" charset="0"/>
+                <a:cs typeface="Arial" panose="020B0604020202020204" pitchFamily="34" charset="0"/>
+              </a:rPr>
+              <a:t>9. </a:t>
+            </a:r>
+            <a:r>
+              <a:rPr lang="ko-KR" altLang="en-US" sz="900" b="0" dirty="0" smtClean="0">
+                <a:latin typeface="Arial" panose="020B0604020202020204" pitchFamily="34" charset="0"/>
+                <a:cs typeface="Arial" panose="020B0604020202020204" pitchFamily="34" charset="0"/>
+              </a:rPr>
+              <a:t>화상 상담 신청</a:t>
+            </a:r>
+            <a:endParaRPr lang="en-US" altLang="ko-KR" sz="900" b="0" dirty="0" smtClean="0">
+              <a:latin typeface="Arial" panose="020B0604020202020204" pitchFamily="34" charset="0"/>
+              <a:cs typeface="Arial" panose="020B0604020202020204" pitchFamily="34" charset="0"/>
+            </a:endParaRPr>
+          </a:p>
+          <a:p>
+            <a:pPr marL="171450" marR="0" indent="-171450" defTabSz="914400" rtl="0" eaLnBrk="1" fontAlgn="base" latinLnBrk="0" hangingPunct="1">
+              <a:lnSpc>
+                <a:spcPct val="100000"/>
+              </a:lnSpc>
+              <a:spcBef>
+                <a:spcPct val="20000"/>
+              </a:spcBef>
+              <a:spcAft>
+                <a:spcPct val="20000"/>
+              </a:spcAft>
+              <a:buClrTx/>
+              <a:buSzTx/>
+              <a:buFontTx/>
+              <a:buChar char="-"/>
+              <a:tabLst/>
+            </a:pPr>
+            <a:r>
+              <a:rPr lang="ko-KR" altLang="en-US" sz="900" b="0" dirty="0" smtClean="0">
+                <a:latin typeface="Arial" panose="020B0604020202020204" pitchFamily="34" charset="0"/>
+                <a:cs typeface="Arial" panose="020B0604020202020204" pitchFamily="34" charset="0"/>
+              </a:rPr>
+              <a:t>화상 상담 신청을 환자가 먼저 하는 것인지</a:t>
+            </a:r>
+            <a:r>
+              <a:rPr lang="en-US" altLang="ko-KR" sz="900" b="0" dirty="0" smtClean="0">
+                <a:latin typeface="Arial" panose="020B0604020202020204" pitchFamily="34" charset="0"/>
+                <a:cs typeface="Arial" panose="020B0604020202020204" pitchFamily="34" charset="0"/>
+              </a:rPr>
+              <a:t>?</a:t>
+            </a:r>
+          </a:p>
+          <a:p>
+            <a:pPr marL="171450" marR="0" indent="-171450" defTabSz="914400" rtl="0" eaLnBrk="1" fontAlgn="base" latinLnBrk="0" hangingPunct="1">
+              <a:lnSpc>
+                <a:spcPct val="100000"/>
+              </a:lnSpc>
+              <a:spcBef>
+                <a:spcPct val="20000"/>
+              </a:spcBef>
+              <a:spcAft>
+                <a:spcPct val="20000"/>
+              </a:spcAft>
+              <a:buClrTx/>
+              <a:buSzTx/>
+              <a:buFontTx/>
+              <a:buChar char="-"/>
+              <a:tabLst/>
+            </a:pPr>
+            <a:r>
+              <a:rPr lang="ko-KR" altLang="en-US" sz="900" b="0" dirty="0" smtClean="0">
+                <a:latin typeface="Arial" panose="020B0604020202020204" pitchFamily="34" charset="0"/>
+                <a:cs typeface="Arial" panose="020B0604020202020204" pitchFamily="34" charset="0"/>
+              </a:rPr>
+              <a:t>예약시간에 맞춰 의사가 전화 연결을 시도하는 것인지</a:t>
+            </a:r>
+            <a:r>
+              <a:rPr lang="en-US" altLang="ko-KR" sz="900" b="0" dirty="0" smtClean="0">
+                <a:latin typeface="Arial" panose="020B0604020202020204" pitchFamily="34" charset="0"/>
+                <a:cs typeface="Arial" panose="020B0604020202020204" pitchFamily="34" charset="0"/>
+              </a:rPr>
+              <a:t>?</a:t>
+            </a:r>
           </a:p>
         </p:txBody>
       </p:sp>
@@ -22848,7 +23482,7 @@
                 <a:hlinkClick r:id="rId2" action="ppaction://hlinksldjump">
                   <a:extLst>
                     <a:ext uri="{A12FA001-AC4F-418D-AE19-62706E023703}">
-                      <ahyp:hlinkClr xmlns:ahyp="http://schemas.microsoft.com/office/drawing/2018/hyperlinkcolor" xmlns="" val="tx"/>
+                      <ahyp:hlinkClr xmlns="" xmlns:ahyp="http://schemas.microsoft.com/office/drawing/2018/hyperlinkcolor" val="tx"/>
                     </a:ext>
                   </a:extLst>
                 </a:hlinkClick>
@@ -22861,7 +23495,7 @@
               <a:hlinkClick r:id="rId2" action="ppaction://hlinksldjump">
                 <a:extLst>
                   <a:ext uri="{A12FA001-AC4F-418D-AE19-62706E023703}">
-                    <ahyp:hlinkClr xmlns:ahyp="http://schemas.microsoft.com/office/drawing/2018/hyperlinkcolor" xmlns="" val="tx"/>
+                    <ahyp:hlinkClr xmlns="" xmlns:ahyp="http://schemas.microsoft.com/office/drawing/2018/hyperlinkcolor" val="tx"/>
                   </a:ext>
                 </a:extLst>
               </a:hlinkClick>
@@ -22884,7 +23518,7 @@
         <p:spPr bwMode="auto">
           <a:xfrm>
             <a:off x="344487" y="5624512"/>
-            <a:ext cx="9217025" cy="979615"/>
+            <a:ext cx="4536505" cy="979615"/>
           </a:xfrm>
           <a:prstGeom prst="roundRect">
             <a:avLst>
@@ -24622,6 +25256,197 @@
           </a:prstGeom>
         </p:spPr>
       </p:pic>
+      <p:sp>
+        <p:nvSpPr>
+          <p:cNvPr id="36" name="모서리가 둥근 직사각형 35"/>
+          <p:cNvSpPr/>
+          <p:nvPr/>
+        </p:nvSpPr>
+        <p:spPr bwMode="auto">
+          <a:xfrm>
+            <a:off x="5096394" y="5553236"/>
+            <a:ext cx="4429202" cy="1067907"/>
+          </a:xfrm>
+          <a:prstGeom prst="roundRect">
+            <a:avLst/>
+          </a:prstGeom>
+          <a:solidFill>
+            <a:srgbClr val="FFFF00"/>
+          </a:solidFill>
+          <a:ln w="9525" cap="flat" cmpd="sng" algn="ctr">
+            <a:solidFill>
+              <a:schemeClr val="tx1">
+                <a:lumMod val="50000"/>
+                <a:lumOff val="50000"/>
+              </a:schemeClr>
+            </a:solidFill>
+            <a:prstDash val="solid"/>
+            <a:round/>
+            <a:headEnd type="none" w="med" len="med"/>
+            <a:tailEnd type="none" w="med" len="med"/>
+          </a:ln>
+          <a:effectLst/>
+        </p:spPr>
+        <p:txBody>
+          <a:bodyPr vert="horz" wrap="none" lIns="91440" tIns="45720" rIns="91440" bIns="45720" numCol="1" rtlCol="0" anchor="t" anchorCtr="0" compatLnSpc="1">
+            <a:prstTxWarp prst="textNoShape">
+              <a:avLst/>
+            </a:prstTxWarp>
+          </a:bodyPr>
+          <a:lstStyle/>
+          <a:p>
+            <a:pPr marR="0" defTabSz="914400" rtl="0" eaLnBrk="1" fontAlgn="base" latinLnBrk="0" hangingPunct="1">
+              <a:lnSpc>
+                <a:spcPct val="100000"/>
+              </a:lnSpc>
+              <a:spcBef>
+                <a:spcPct val="20000"/>
+              </a:spcBef>
+              <a:spcAft>
+                <a:spcPct val="20000"/>
+              </a:spcAft>
+              <a:buClrTx/>
+              <a:buSzTx/>
+              <a:tabLst/>
+            </a:pPr>
+            <a:r>
+              <a:rPr lang="en-US" altLang="ko-KR" sz="900" b="0" dirty="0" smtClean="0">
+                <a:latin typeface="Arial" panose="020B0604020202020204" pitchFamily="34" charset="0"/>
+                <a:cs typeface="Arial" panose="020B0604020202020204" pitchFamily="34" charset="0"/>
+              </a:rPr>
+              <a:t>3. </a:t>
+            </a:r>
+            <a:r>
+              <a:rPr lang="ko-KR" altLang="en-US" sz="900" b="0" dirty="0" smtClean="0">
+                <a:latin typeface="Arial" panose="020B0604020202020204" pitchFamily="34" charset="0"/>
+                <a:cs typeface="Arial" panose="020B0604020202020204" pitchFamily="34" charset="0"/>
+              </a:rPr>
+              <a:t>주문 상세</a:t>
+            </a:r>
+            <a:endParaRPr lang="en-US" altLang="ko-KR" sz="900" b="0" dirty="0">
+              <a:latin typeface="Arial" panose="020B0604020202020204" pitchFamily="34" charset="0"/>
+              <a:cs typeface="Arial" panose="020B0604020202020204" pitchFamily="34" charset="0"/>
+            </a:endParaRPr>
+          </a:p>
+          <a:p>
+            <a:pPr marL="171450" marR="0" indent="-171450" defTabSz="914400" rtl="0" eaLnBrk="1" fontAlgn="base" latinLnBrk="0" hangingPunct="1">
+              <a:lnSpc>
+                <a:spcPct val="100000"/>
+              </a:lnSpc>
+              <a:spcBef>
+                <a:spcPct val="20000"/>
+              </a:spcBef>
+              <a:spcAft>
+                <a:spcPct val="20000"/>
+              </a:spcAft>
+              <a:buClrTx/>
+              <a:buSzTx/>
+              <a:buFontTx/>
+              <a:buChar char="-"/>
+              <a:tabLst/>
+            </a:pPr>
+            <a:r>
+              <a:rPr lang="ko-KR" altLang="en-US" sz="900" b="0" dirty="0" smtClean="0">
+                <a:latin typeface="Arial" panose="020B0604020202020204" pitchFamily="34" charset="0"/>
+                <a:cs typeface="Arial" panose="020B0604020202020204" pitchFamily="34" charset="0"/>
+              </a:rPr>
+              <a:t>거절하기</a:t>
+            </a:r>
+            <a:r>
+              <a:rPr lang="en-US" altLang="ko-KR" sz="900" b="0" dirty="0" smtClean="0">
+                <a:latin typeface="Arial" panose="020B0604020202020204" pitchFamily="34" charset="0"/>
+                <a:cs typeface="Arial" panose="020B0604020202020204" pitchFamily="34" charset="0"/>
+              </a:rPr>
+              <a:t>: </a:t>
+            </a:r>
+            <a:r>
+              <a:rPr lang="ko-KR" altLang="en-US" sz="900" b="0" dirty="0" smtClean="0">
+                <a:latin typeface="Arial" panose="020B0604020202020204" pitchFamily="34" charset="0"/>
+                <a:cs typeface="Arial" panose="020B0604020202020204" pitchFamily="34" charset="0"/>
+              </a:rPr>
+              <a:t>상담을 </a:t>
+            </a:r>
+            <a:r>
+              <a:rPr lang="ko-KR" altLang="en-US" sz="900" b="0" dirty="0" smtClean="0">
+                <a:latin typeface="Arial" panose="020B0604020202020204" pitchFamily="34" charset="0"/>
+                <a:cs typeface="Arial" panose="020B0604020202020204" pitchFamily="34" charset="0"/>
+              </a:rPr>
+              <a:t>거절하면 어떻게 되는 것 인지</a:t>
+            </a:r>
+            <a:r>
+              <a:rPr lang="en-US" altLang="ko-KR" sz="900" b="0" dirty="0" smtClean="0">
+                <a:latin typeface="Arial" panose="020B0604020202020204" pitchFamily="34" charset="0"/>
+                <a:cs typeface="Arial" panose="020B0604020202020204" pitchFamily="34" charset="0"/>
+              </a:rPr>
+              <a:t>? </a:t>
+            </a:r>
+            <a:r>
+              <a:rPr lang="ko-KR" altLang="en-US" sz="900" b="0" dirty="0" smtClean="0">
+                <a:latin typeface="Arial" panose="020B0604020202020204" pitchFamily="34" charset="0"/>
+                <a:cs typeface="Arial" panose="020B0604020202020204" pitchFamily="34" charset="0"/>
+              </a:rPr>
+              <a:t>환불</a:t>
+            </a:r>
+            <a:r>
+              <a:rPr lang="en-US" altLang="ko-KR" sz="900" b="0" dirty="0" smtClean="0">
+                <a:latin typeface="Arial" panose="020B0604020202020204" pitchFamily="34" charset="0"/>
+                <a:cs typeface="Arial" panose="020B0604020202020204" pitchFamily="34" charset="0"/>
+              </a:rPr>
+              <a:t>?</a:t>
+            </a:r>
+          </a:p>
+          <a:p>
+            <a:pPr marL="171450" marR="0" indent="-171450" defTabSz="914400" rtl="0" eaLnBrk="1" fontAlgn="base" latinLnBrk="0" hangingPunct="1">
+              <a:lnSpc>
+                <a:spcPct val="100000"/>
+              </a:lnSpc>
+              <a:spcBef>
+                <a:spcPct val="20000"/>
+              </a:spcBef>
+              <a:spcAft>
+                <a:spcPct val="20000"/>
+              </a:spcAft>
+              <a:buClrTx/>
+              <a:buSzTx/>
+              <a:buFontTx/>
+              <a:buChar char="-"/>
+              <a:tabLst/>
+            </a:pPr>
+            <a:r>
+              <a:rPr lang="ko-KR" altLang="en-US" sz="900" b="0" dirty="0" smtClean="0">
+                <a:latin typeface="Arial" panose="020B0604020202020204" pitchFamily="34" charset="0"/>
+                <a:cs typeface="Arial" panose="020B0604020202020204" pitchFamily="34" charset="0"/>
+              </a:rPr>
+              <a:t>메시지 보내기 </a:t>
+            </a:r>
+            <a:r>
+              <a:rPr lang="en-US" altLang="ko-KR" sz="900" b="0" dirty="0" smtClean="0">
+                <a:latin typeface="Arial" panose="020B0604020202020204" pitchFamily="34" charset="0"/>
+                <a:cs typeface="Arial" panose="020B0604020202020204" pitchFamily="34" charset="0"/>
+              </a:rPr>
+              <a:t>: </a:t>
+            </a:r>
+            <a:r>
+              <a:rPr lang="ko-KR" altLang="en-US" sz="900" b="0" dirty="0" smtClean="0">
+                <a:latin typeface="Arial" panose="020B0604020202020204" pitchFamily="34" charset="0"/>
+                <a:cs typeface="Arial" panose="020B0604020202020204" pitchFamily="34" charset="0"/>
+              </a:rPr>
+              <a:t>해당 기능의 용도는</a:t>
+            </a:r>
+            <a:r>
+              <a:rPr lang="en-US" altLang="ko-KR" sz="900" b="0" dirty="0" smtClean="0">
+                <a:latin typeface="Arial" panose="020B0604020202020204" pitchFamily="34" charset="0"/>
+                <a:cs typeface="Arial" panose="020B0604020202020204" pitchFamily="34" charset="0"/>
+              </a:rPr>
+              <a:t>??</a:t>
+            </a:r>
+            <a:endParaRPr lang="en-US" altLang="ko-KR" sz="900" b="0" dirty="0" smtClean="0">
+              <a:latin typeface="Arial" panose="020B0604020202020204" pitchFamily="34" charset="0"/>
+              <a:cs typeface="Arial" panose="020B0604020202020204" pitchFamily="34" charset="0"/>
+            </a:endParaRPr>
+          </a:p>
+        </p:txBody>
+      </p:sp>
     </p:spTree>
     <p:extLst>
       <p:ext uri="{BB962C8B-B14F-4D97-AF65-F5344CB8AC3E}">
@@ -24672,7 +25497,7 @@
           <a:graphicData uri="http://schemas.openxmlformats.org/presentationml/2006/ole">
             <mc:AlternateContent xmlns:mc="http://schemas.openxmlformats.org/markup-compatibility/2006">
               <mc:Choice xmlns:v="urn:schemas-microsoft-com:vml" Requires="v">
-                <p:oleObj spid="_x0000_s16403" name="think-cell Slide" r:id="rId4" imgW="180" imgH="180" progId="TCLayout.ActiveDocument.1">
+                <p:oleObj spid="_x0000_s16404" name="think-cell Slide" r:id="rId4" imgW="180" imgH="180" progId="TCLayout.ActiveDocument.1">
                   <p:embed/>
                 </p:oleObj>
               </mc:Choice>
@@ -31056,7 +31881,7 @@
                 <a:hlinkClick r:id="rId8" action="ppaction://hlinksldjump">
                   <a:extLst>
                     <a:ext uri="{A12FA001-AC4F-418D-AE19-62706E023703}">
-                      <ahyp:hlinkClr xmlns:ahyp="http://schemas.microsoft.com/office/drawing/2018/hyperlinkcolor" xmlns="" val="tx"/>
+                      <ahyp:hlinkClr xmlns="" xmlns:ahyp="http://schemas.microsoft.com/office/drawing/2018/hyperlinkcolor" val="tx"/>
                     </a:ext>
                   </a:extLst>
                 </a:hlinkClick>
@@ -31069,7 +31894,7 @@
               <a:hlinkClick r:id="rId8" action="ppaction://hlinksldjump">
                 <a:extLst>
                   <a:ext uri="{A12FA001-AC4F-418D-AE19-62706E023703}">
-                    <ahyp:hlinkClr xmlns:ahyp="http://schemas.microsoft.com/office/drawing/2018/hyperlinkcolor" xmlns="" val="tx"/>
+                    <ahyp:hlinkClr xmlns="" xmlns:ahyp="http://schemas.microsoft.com/office/drawing/2018/hyperlinkcolor" val="tx"/>
                   </a:ext>
                 </a:extLst>
               </a:hlinkClick>
@@ -33398,7 +34223,7 @@
                 <a:hlinkClick r:id="rId7" action="ppaction://hlinksldjump">
                   <a:extLst>
                     <a:ext uri="{A12FA001-AC4F-418D-AE19-62706E023703}">
-                      <ahyp:hlinkClr xmlns:ahyp="http://schemas.microsoft.com/office/drawing/2018/hyperlinkcolor" xmlns="" val="tx"/>
+                      <ahyp:hlinkClr xmlns="" xmlns:ahyp="http://schemas.microsoft.com/office/drawing/2018/hyperlinkcolor" val="tx"/>
                     </a:ext>
                   </a:extLst>
                 </a:hlinkClick>
@@ -33411,7 +34236,7 @@
               <a:hlinkClick r:id="rId7" action="ppaction://hlinksldjump">
                 <a:extLst>
                   <a:ext uri="{A12FA001-AC4F-418D-AE19-62706E023703}">
-                    <ahyp:hlinkClr xmlns:ahyp="http://schemas.microsoft.com/office/drawing/2018/hyperlinkcolor" xmlns="" val="tx"/>
+                    <ahyp:hlinkClr xmlns="" xmlns:ahyp="http://schemas.microsoft.com/office/drawing/2018/hyperlinkcolor" val="tx"/>
                   </a:ext>
                 </a:extLst>
               </a:hlinkClick>
@@ -35227,7 +36052,7 @@
                 <a:hlinkClick r:id="rId8" action="ppaction://hlinksldjump">
                   <a:extLst>
                     <a:ext uri="{A12FA001-AC4F-418D-AE19-62706E023703}">
-                      <ahyp:hlinkClr xmlns:ahyp="http://schemas.microsoft.com/office/drawing/2018/hyperlinkcolor" xmlns="" val="tx"/>
+                      <ahyp:hlinkClr xmlns="" xmlns:ahyp="http://schemas.microsoft.com/office/drawing/2018/hyperlinkcolor" val="tx"/>
                     </a:ext>
                   </a:extLst>
                 </a:hlinkClick>
@@ -35240,7 +36065,7 @@
               <a:hlinkClick r:id="rId8" action="ppaction://hlinksldjump">
                 <a:extLst>
                   <a:ext uri="{A12FA001-AC4F-418D-AE19-62706E023703}">
-                    <ahyp:hlinkClr xmlns:ahyp="http://schemas.microsoft.com/office/drawing/2018/hyperlinkcolor" xmlns="" val="tx"/>
+                    <ahyp:hlinkClr xmlns="" xmlns:ahyp="http://schemas.microsoft.com/office/drawing/2018/hyperlinkcolor" val="tx"/>
                   </a:ext>
                 </a:extLst>
               </a:hlinkClick>
@@ -35637,7 +36462,7 @@
                 <a:hlinkClick r:id="rId3" action="ppaction://hlinksldjump">
                   <a:extLst>
                     <a:ext uri="{A12FA001-AC4F-418D-AE19-62706E023703}">
-                      <ahyp:hlinkClr xmlns:ahyp="http://schemas.microsoft.com/office/drawing/2018/hyperlinkcolor" xmlns="" val="tx"/>
+                      <ahyp:hlinkClr xmlns="" xmlns:ahyp="http://schemas.microsoft.com/office/drawing/2018/hyperlinkcolor" val="tx"/>
                     </a:ext>
                   </a:extLst>
                 </a:hlinkClick>
@@ -35650,7 +36475,7 @@
               <a:hlinkClick r:id="rId3" action="ppaction://hlinksldjump">
                 <a:extLst>
                   <a:ext uri="{A12FA001-AC4F-418D-AE19-62706E023703}">
-                    <ahyp:hlinkClr xmlns:ahyp="http://schemas.microsoft.com/office/drawing/2018/hyperlinkcolor" xmlns="" val="tx"/>
+                    <ahyp:hlinkClr xmlns="" xmlns:ahyp="http://schemas.microsoft.com/office/drawing/2018/hyperlinkcolor" val="tx"/>
                   </a:ext>
                 </a:extLst>
               </a:hlinkClick>
@@ -37018,7 +37843,7 @@
           <a:graphicData uri="http://schemas.openxmlformats.org/presentationml/2006/ole">
             <mc:AlternateContent xmlns:mc="http://schemas.openxmlformats.org/markup-compatibility/2006">
               <mc:Choice xmlns:v="urn:schemas-microsoft-com:vml" Requires="v">
-                <p:oleObj spid="_x0000_s17425" name="think-cell Slide" r:id="rId4" imgW="180" imgH="180" progId="TCLayout.ActiveDocument.1">
+                <p:oleObj spid="_x0000_s17426" name="think-cell Slide" r:id="rId4" imgW="180" imgH="180" progId="TCLayout.ActiveDocument.1">
                   <p:embed/>
                 </p:oleObj>
               </mc:Choice>
@@ -37205,7 +38030,7 @@
           <a:graphicData uri="http://schemas.openxmlformats.org/presentationml/2006/ole">
             <mc:AlternateContent xmlns:mc="http://schemas.openxmlformats.org/markup-compatibility/2006">
               <mc:Choice xmlns:v="urn:schemas-microsoft-com:vml" Requires="v">
-                <p:oleObj spid="_x0000_s14368" name="think-cell Slide" r:id="rId4" imgW="180" imgH="180" progId="TCLayout.ActiveDocument.1">
+                <p:oleObj spid="_x0000_s14369" name="think-cell Slide" r:id="rId4" imgW="180" imgH="180" progId="TCLayout.ActiveDocument.1">
                   <p:embed/>
                 </p:oleObj>
               </mc:Choice>

</xml_diff>